<commit_message>
rectification ppt+MAJ de la javadoc
</commit_message>
<xml_diff>
--- a/PROJET-JAVA/Projet ECECOLE.pptx
+++ b/PROJET-JAVA/Projet ECECOLE.pptx
@@ -5761,7 +5761,7 @@
         <p:spPr>
           <a:xfrm>
             <a:off x="909836" y="1988840"/>
-            <a:ext cx="10369153" cy="3416320"/>
+            <a:ext cx="10369153" cy="3785652"/>
           </a:xfrm>
           <a:prstGeom prst="rect">
             <a:avLst/>
@@ -5790,17 +5790,13 @@
           <a:p>
             <a:r>
               <a:rPr lang="fr-FR" sz="2400" dirty="0"/>
-              <a:t>                                                  Classes où sont stockés les informations</a:t>
-            </a:r>
-          </a:p>
-          <a:p>
-            <a:r>
-              <a:rPr lang="fr-FR" sz="2400"/>
-              <a:t>                                                                  où </a:t>
-            </a:r>
+              <a:t>                                                  Classes où sont stockées les informations</a:t>
+            </a:r>
+          </a:p>
+          <a:p>
             <a:r>
               <a:rPr lang="fr-FR" sz="2400" dirty="0"/>
-              <a:t>sont modifiées les données</a:t>
+              <a:t>                                                                  de la BD.</a:t>
             </a:r>
           </a:p>
           <a:p>
@@ -5815,7 +5811,7 @@
           <a:p>
             <a:r>
               <a:rPr lang="fr-FR" sz="2400" dirty="0"/>
-              <a:t>                                                  Affichage</a:t>
+              <a:t>                                                  Interface graphique.</a:t>
             </a:r>
           </a:p>
           <a:p>
@@ -5830,7 +5826,7 @@
           <a:p>
             <a:r>
               <a:rPr lang="fr-FR" sz="2400" dirty="0"/>
-              <a:t>                                                  Interaction avec l’utilisateur </a:t>
+              <a:t>                                                  Gère les connexions et les requêtes avec la BD depuis 				    l’interface graphique.</a:t>
             </a:r>
           </a:p>
         </p:txBody>
@@ -7320,6 +7316,15 @@
 </file>
 
 <file path=customXml/item2.xml><?xml version="1.0" encoding="utf-8"?>
+<?mso-contentType ?>
+<FormTemplates xmlns="http://schemas.microsoft.com/sharepoint/v3/contenttype/forms">
+  <Display>DocumentLibraryForm</Display>
+  <Edit>AssetEditForm</Edit>
+  <New>DocumentLibraryForm</New>
+</FormTemplates>
+</file>
+
+<file path=customXml/item3.xml><?xml version="1.0" encoding="utf-8"?>
 <ct:contentTypeSchema xmlns:ct="http://schemas.microsoft.com/office/2006/metadata/contentType" xmlns:ma="http://schemas.microsoft.com/office/2006/metadata/properties/metaAttributes" ct:_="" ma:_="" ma:contentTypeName="TemplateFile" ma:contentTypeID="0x0101006EDDDB5EE6D98C44930B742096920B300400F5B6D36B3EF94B4E9A635CDF2A18F5B8" ma:contentTypeVersion="72" ma:contentTypeDescription="Create a new document." ma:contentTypeScope="" ma:versionID="a23e56308344d904b51738559c3d67c9">
   <xsd:schema xmlns:xsd="http://www.w3.org/2001/XMLSchema" xmlns:xs="http://www.w3.org/2001/XMLSchema" xmlns:p="http://schemas.microsoft.com/office/2006/metadata/properties" xmlns:ns2="4873beb7-5857-4685-be1f-d57550cc96cc" targetNamespace="http://schemas.microsoft.com/office/2006/metadata/properties" ma:root="true" ma:fieldsID="cd0908cc4600e77bf5da051303e00c8d" ns2:_="">
     <xsd:import namespace="4873beb7-5857-4685-be1f-d57550cc96cc"/>
@@ -8359,32 +8364,31 @@
 </ct:contentTypeSchema>
 </file>
 
-<file path=customXml/item3.xml><?xml version="1.0" encoding="utf-8"?>
-<?mso-contentType ?>
-<FormTemplates xmlns="http://schemas.microsoft.com/sharepoint/v3/contenttype/forms">
-  <Display>DocumentLibraryForm</Display>
-  <Edit>AssetEditForm</Edit>
-  <New>DocumentLibraryForm</New>
-</FormTemplates>
-</file>
-
 <file path=customXml/itemProps1.xml><?xml version="1.0" encoding="utf-8"?>
 <ds:datastoreItem xmlns:ds="http://schemas.openxmlformats.org/officeDocument/2006/customXml" ds:itemID="{00E41224-0370-4595-877C-23316CD80004}">
   <ds:schemaRefs>
-    <ds:schemaRef ds:uri="http://schemas.microsoft.com/office/infopath/2007/PartnerControls"/>
+    <ds:schemaRef ds:uri="http://schemas.microsoft.com/office/2006/metadata/properties"/>
     <ds:schemaRef ds:uri="http://purl.org/dc/terms/"/>
     <ds:schemaRef ds:uri="http://schemas.microsoft.com/office/2006/documentManagement/types"/>
+    <ds:schemaRef ds:uri="http://www.w3.org/XML/1998/namespace"/>
+    <ds:schemaRef ds:uri="http://schemas.openxmlformats.org/package/2006/metadata/core-properties"/>
     <ds:schemaRef ds:uri="http://purl.org/dc/elements/1.1/"/>
-    <ds:schemaRef ds:uri="http://schemas.microsoft.com/office/2006/metadata/properties"/>
-    <ds:schemaRef ds:uri="http://schemas.openxmlformats.org/package/2006/metadata/core-properties"/>
+    <ds:schemaRef ds:uri="http://schemas.microsoft.com/office/infopath/2007/PartnerControls"/>
     <ds:schemaRef ds:uri="4873beb7-5857-4685-be1f-d57550cc96cc"/>
-    <ds:schemaRef ds:uri="http://www.w3.org/XML/1998/namespace"/>
     <ds:schemaRef ds:uri="http://purl.org/dc/dcmitype/"/>
   </ds:schemaRefs>
 </ds:datastoreItem>
 </file>
 
 <file path=customXml/itemProps2.xml><?xml version="1.0" encoding="utf-8"?>
+<ds:datastoreItem xmlns:ds="http://schemas.openxmlformats.org/officeDocument/2006/customXml" ds:itemID="{74228E6B-D70C-44BB-A81F-A245495F612B}">
+  <ds:schemaRefs>
+    <ds:schemaRef ds:uri="http://schemas.microsoft.com/sharepoint/v3/contenttype/forms"/>
+  </ds:schemaRefs>
+</ds:datastoreItem>
+</file>
+
+<file path=customXml/itemProps3.xml><?xml version="1.0" encoding="utf-8"?>
 <ds:datastoreItem xmlns:ds="http://schemas.openxmlformats.org/officeDocument/2006/customXml" ds:itemID="{22CCB507-0646-4A50-A4F7-7F385079D589}">
   <ds:schemaRefs>
     <ds:schemaRef ds:uri="http://schemas.microsoft.com/office/2006/metadata/contentType"/>
@@ -8400,12 +8404,4 @@
     <ds:schemaRef ds:uri="http://schemas.microsoft.com/internal/obd"/>
   </ds:schemaRefs>
 </ds:datastoreItem>
-</file>
-
-<file path=customXml/itemProps3.xml><?xml version="1.0" encoding="utf-8"?>
-<ds:datastoreItem xmlns:ds="http://schemas.openxmlformats.org/officeDocument/2006/customXml" ds:itemID="{74228E6B-D70C-44BB-A81F-A245495F612B}">
-  <ds:schemaRefs>
-    <ds:schemaRef ds:uri="http://schemas.microsoft.com/sharepoint/v3/contenttype/forms"/>
-  </ds:schemaRefs>
-</ds:datastoreItem>
 </file>
</xml_diff>